<commit_message>
Minor tweaks for clarity.
</commit_message>
<xml_diff>
--- a/ResilientFaultTolerance.pptx
+++ b/ResilientFaultTolerance.pptx
@@ -253,7 +253,7 @@
           <a:p>
             <a:fld id="{F5457D03-6B1D-415B-8CDE-DE157993C910}" type="datetimeFigureOut">
               <a:rPr lang="en-US" smtClean="0"/>
-              <a:t>8/14/2019</a:t>
+              <a:t>8/19/2019</a:t>
             </a:fld>
             <a:endParaRPr lang="en-US"/>
           </a:p>
@@ -1454,7 +1454,7 @@
           <a:p>
             <a:fld id="{DB277FD4-6F62-4072-884E-53BD33EE21AD}" type="datetime1">
               <a:rPr lang="en-US" smtClean="0"/>
-              <a:t>8/14/2019</a:t>
+              <a:t>8/19/2019</a:t>
             </a:fld>
             <a:endParaRPr lang="en-US"/>
           </a:p>
@@ -1666,7 +1666,7 @@
           <a:p>
             <a:fld id="{9F90232B-CE5B-4328-A9C3-2A24ED0D12D6}" type="datetime1">
               <a:rPr lang="en-US" smtClean="0"/>
-              <a:t>8/14/2019</a:t>
+              <a:t>8/19/2019</a:t>
             </a:fld>
             <a:endParaRPr lang="en-US"/>
           </a:p>
@@ -1925,7 +1925,7 @@
           <a:p>
             <a:fld id="{0C92B229-45C0-460C-A040-33377D746229}" type="datetime1">
               <a:rPr lang="en-US" smtClean="0"/>
-              <a:t>8/14/2019</a:t>
+              <a:t>8/19/2019</a:t>
             </a:fld>
             <a:endParaRPr lang="en-US"/>
           </a:p>
@@ -2098,7 +2098,7 @@
           <a:p>
             <a:fld id="{BA0F38E7-9941-4203-A261-C009CBCCF38D}" type="datetime1">
               <a:rPr lang="en-US" smtClean="0"/>
-              <a:t>8/14/2019</a:t>
+              <a:t>8/19/2019</a:t>
             </a:fld>
             <a:endParaRPr lang="en-US"/>
           </a:p>
@@ -2444,7 +2444,7 @@
           <a:p>
             <a:fld id="{7DCF51F0-00A5-4A4C-921E-AC201FC6896E}" type="datetime1">
               <a:rPr lang="en-US" smtClean="0"/>
-              <a:t>8/14/2019</a:t>
+              <a:t>8/19/2019</a:t>
             </a:fld>
             <a:endParaRPr lang="en-US"/>
           </a:p>
@@ -2722,7 +2722,7 @@
           <a:p>
             <a:fld id="{5EB2874E-DDE8-4CE4-9506-11F6EE6A859B}" type="datetime1">
               <a:rPr lang="en-US" smtClean="0"/>
-              <a:t>8/14/2019</a:t>
+              <a:t>8/19/2019</a:t>
             </a:fld>
             <a:endParaRPr lang="en-US"/>
           </a:p>
@@ -3104,7 +3104,7 @@
           <a:p>
             <a:fld id="{63D68EF0-BF8F-4E3C-9C05-745CC29F35F6}" type="datetime1">
               <a:rPr lang="en-US" smtClean="0"/>
-              <a:t>8/14/2019</a:t>
+              <a:t>8/19/2019</a:t>
             </a:fld>
             <a:endParaRPr lang="en-US"/>
           </a:p>
@@ -3225,7 +3225,7 @@
           <a:p>
             <a:fld id="{277C0380-A3C3-474B-ABAB-1F42FF55D86B}" type="datetime1">
               <a:rPr lang="en-US" smtClean="0"/>
-              <a:t>8/14/2019</a:t>
+              <a:t>8/19/2019</a:t>
             </a:fld>
             <a:endParaRPr lang="en-US"/>
           </a:p>
@@ -3399,7 +3399,7 @@
           <a:p>
             <a:fld id="{22885D81-B49B-4A1F-A46B-3FA8860DE8E3}" type="datetime1">
               <a:rPr lang="en-US" smtClean="0"/>
-              <a:t>8/14/2019</a:t>
+              <a:t>8/19/2019</a:t>
             </a:fld>
             <a:endParaRPr lang="en-US"/>
           </a:p>
@@ -3756,7 +3756,7 @@
           <a:p>
             <a:fld id="{CE003DDC-C3D7-4B7E-9D6E-6FE1E60E6CD6}" type="datetime1">
               <a:rPr lang="en-US" smtClean="0"/>
-              <a:t>8/14/2019</a:t>
+              <a:t>8/19/2019</a:t>
             </a:fld>
             <a:endParaRPr lang="en-US"/>
           </a:p>
@@ -3774,8 +3774,8 @@
         </p:nvSpPr>
         <p:spPr>
           <a:xfrm>
-            <a:off x="4800600" y="6459785"/>
-            <a:ext cx="5628736" cy="365125"/>
+            <a:off x="4675517" y="6459785"/>
+            <a:ext cx="5753819" cy="365125"/>
           </a:xfrm>
         </p:spPr>
         <p:txBody>
@@ -3791,10 +3791,9 @@
           </a:lstStyle>
           <a:p>
             <a:r>
-              <a:rPr lang="en-US"/>
+              <a:rPr lang="en-US" dirty="0"/>
               <a:t>https://github.com/joegardnr/ResilientFaultTolerance</a:t>
             </a:r>
-            <a:endParaRPr lang="en-US" dirty="0"/>
           </a:p>
         </p:txBody>
       </p:sp>
@@ -4137,7 +4136,7 @@
           <a:p>
             <a:fld id="{4C50796D-ED4F-411B-9976-A0E140ED846B}" type="datetime1">
               <a:rPr lang="en-US" smtClean="0"/>
-              <a:t>8/14/2019</a:t>
+              <a:t>8/19/2019</a:t>
             </a:fld>
             <a:endParaRPr lang="en-US"/>
           </a:p>
@@ -4426,7 +4425,7 @@
           <a:p>
             <a:fld id="{256BFE09-05DC-4212-9A86-C209753491E3}" type="datetime1">
               <a:rPr lang="en-US" smtClean="0"/>
-              <a:t>8/14/2019</a:t>
+              <a:t>8/19/2019</a:t>
             </a:fld>
             <a:endParaRPr lang="en-US" dirty="0"/>
           </a:p>
@@ -7666,7 +7665,7 @@
                 </a:solidFill>
                 <a:latin typeface="Consolas" panose="020B0609020204030204" pitchFamily="49" charset="0"/>
               </a:rPr>
-              <a:t>“</a:t>
+              <a:t>"</a:t>
             </a:r>
             <a:r>
               <a:rPr lang="en-US" dirty="0" err="1">
@@ -7755,7 +7754,7 @@
                 </a:solidFill>
                 <a:latin typeface="Consolas" panose="020B0609020204030204" pitchFamily="49" charset="0"/>
               </a:rPr>
-              <a:t>“</a:t>
+              <a:t>"</a:t>
             </a:r>
             <a:r>
               <a:rPr lang="en-US" dirty="0" err="1">

</xml_diff>

<commit_message>
Update to 3.1 and add OrResult sample.
</commit_message>
<xml_diff>
--- a/ResilientFaultTolerance.pptx
+++ b/ResilientFaultTolerance.pptx
@@ -2,7 +2,7 @@
 <file path=ppt/presentation.xml><?xml version="1.0" encoding="utf-8"?>
 <p:presentation xmlns:a="http://schemas.openxmlformats.org/drawingml/2006/main" xmlns:r="http://schemas.openxmlformats.org/officeDocument/2006/relationships" xmlns:p="http://schemas.openxmlformats.org/presentationml/2006/main" saveSubsetFonts="1">
   <p:sldMasterIdLst>
-    <p:sldMasterId id="2147483701" r:id="rId1"/>
+    <p:sldMasterId id="2147483785" r:id="rId1"/>
   </p:sldMasterIdLst>
   <p:notesMasterIdLst>
     <p:notesMasterId r:id="rId22"/>
@@ -253,7 +253,7 @@
           <a:p>
             <a:fld id="{F5457D03-6B1D-415B-8CDE-DE157993C910}" type="datetimeFigureOut">
               <a:rPr lang="en-US" smtClean="0"/>
-              <a:t>8/19/2019</a:t>
+              <a:t>10/6/2020</a:t>
             </a:fld>
             <a:endParaRPr lang="en-US"/>
           </a:p>
@@ -1253,8 +1253,8 @@
         </p:nvSpPr>
         <p:spPr>
           <a:xfrm>
-            <a:off x="3175" y="6400800"/>
-            <a:ext cx="12188825" cy="457200"/>
+            <a:off x="1" y="6400800"/>
+            <a:ext cx="12192000" cy="457200"/>
           </a:xfrm>
           <a:prstGeom prst="rect">
             <a:avLst/>
@@ -1291,8 +1291,8 @@
         </p:nvSpPr>
         <p:spPr>
           <a:xfrm>
-            <a:off x="15" y="6334316"/>
-            <a:ext cx="12188825" cy="64008"/>
+            <a:off x="1" y="6334316"/>
+            <a:ext cx="12192000" cy="66484"/>
           </a:xfrm>
           <a:prstGeom prst="rect">
             <a:avLst/>
@@ -1454,7 +1454,7 @@
           <a:p>
             <a:fld id="{DB277FD4-6F62-4072-884E-53BD33EE21AD}" type="datetime1">
               <a:rPr lang="en-US" smtClean="0"/>
-              <a:t>8/19/2019</a:t>
+              <a:t>10/6/2020</a:t>
             </a:fld>
             <a:endParaRPr lang="en-US"/>
           </a:p>
@@ -1547,7 +1547,7 @@
     </p:spTree>
     <p:extLst>
       <p:ext uri="{BB962C8B-B14F-4D97-AF65-F5344CB8AC3E}">
-        <p14:creationId xmlns:p14="http://schemas.microsoft.com/office/powerpoint/2010/main" val="3341854773"/>
+        <p14:creationId xmlns:p14="http://schemas.microsoft.com/office/powerpoint/2010/main" val="3122709468"/>
       </p:ext>
     </p:extLst>
   </p:cSld>
@@ -1615,7 +1615,7 @@
             <a:pPr lvl="0"/>
             <a:r>
               <a:rPr lang="en-US"/>
-              <a:t>Edit Master text styles</a:t>
+              <a:t>Click to edit Master text styles</a:t>
             </a:r>
           </a:p>
           <a:p>
@@ -1666,7 +1666,7 @@
           <a:p>
             <a:fld id="{9F90232B-CE5B-4328-A9C3-2A24ED0D12D6}" type="datetime1">
               <a:rPr lang="en-US" smtClean="0"/>
-              <a:t>8/19/2019</a:t>
+              <a:t>10/6/2020</a:t>
             </a:fld>
             <a:endParaRPr lang="en-US"/>
           </a:p>
@@ -1720,7 +1720,7 @@
     </p:spTree>
     <p:extLst>
       <p:ext uri="{BB962C8B-B14F-4D97-AF65-F5344CB8AC3E}">
-        <p14:creationId xmlns:p14="http://schemas.microsoft.com/office/powerpoint/2010/main" val="3825057995"/>
+        <p14:creationId xmlns:p14="http://schemas.microsoft.com/office/powerpoint/2010/main" val="2777756573"/>
       </p:ext>
     </p:extLst>
   </p:cSld>
@@ -1874,7 +1874,7 @@
             <a:pPr lvl="0"/>
             <a:r>
               <a:rPr lang="en-US"/>
-              <a:t>Edit Master text styles</a:t>
+              <a:t>Click to edit Master text styles</a:t>
             </a:r>
           </a:p>
           <a:p>
@@ -1925,7 +1925,7 @@
           <a:p>
             <a:fld id="{0C92B229-45C0-460C-A040-33377D746229}" type="datetime1">
               <a:rPr lang="en-US" smtClean="0"/>
-              <a:t>8/19/2019</a:t>
+              <a:t>10/6/2020</a:t>
             </a:fld>
             <a:endParaRPr lang="en-US"/>
           </a:p>
@@ -1979,7 +1979,7 @@
     </p:spTree>
     <p:extLst>
       <p:ext uri="{BB962C8B-B14F-4D97-AF65-F5344CB8AC3E}">
-        <p14:creationId xmlns:p14="http://schemas.microsoft.com/office/powerpoint/2010/main" val="882978949"/>
+        <p14:creationId xmlns:p14="http://schemas.microsoft.com/office/powerpoint/2010/main" val="486517715"/>
       </p:ext>
     </p:extLst>
   </p:cSld>
@@ -2047,7 +2047,7 @@
             <a:pPr lvl="0"/>
             <a:r>
               <a:rPr lang="en-US"/>
-              <a:t>Edit Master text styles</a:t>
+              <a:t>Click to edit Master text styles</a:t>
             </a:r>
           </a:p>
           <a:p>
@@ -2098,7 +2098,7 @@
           <a:p>
             <a:fld id="{BA0F38E7-9941-4203-A261-C009CBCCF38D}" type="datetime1">
               <a:rPr lang="en-US" smtClean="0"/>
-              <a:t>8/19/2019</a:t>
+              <a:t>10/6/2020</a:t>
             </a:fld>
             <a:endParaRPr lang="en-US"/>
           </a:p>
@@ -2120,7 +2120,7 @@
           <a:lstStyle/>
           <a:p>
             <a:r>
-              <a:rPr lang="en-US"/>
+              <a:rPr lang="en-US" dirty="0"/>
               <a:t>https://github.com/joegardnr/ResilientFaultTolerance</a:t>
             </a:r>
           </a:p>
@@ -2152,7 +2152,7 @@
     </p:spTree>
     <p:extLst>
       <p:ext uri="{BB962C8B-B14F-4D97-AF65-F5344CB8AC3E}">
-        <p14:creationId xmlns:p14="http://schemas.microsoft.com/office/powerpoint/2010/main" val="138356045"/>
+        <p14:creationId xmlns:p14="http://schemas.microsoft.com/office/powerpoint/2010/main" val="3080894958"/>
       </p:ext>
     </p:extLst>
   </p:cSld>
@@ -2422,7 +2422,7 @@
             <a:pPr lvl="0"/>
             <a:r>
               <a:rPr lang="en-US"/>
-              <a:t>Edit Master text styles</a:t>
+              <a:t>Click to edit Master text styles</a:t>
             </a:r>
           </a:p>
         </p:txBody>
@@ -2444,7 +2444,7 @@
           <a:p>
             <a:fld id="{7DCF51F0-00A5-4A4C-921E-AC201FC6896E}" type="datetime1">
               <a:rPr lang="en-US" smtClean="0"/>
-              <a:t>8/19/2019</a:t>
+              <a:t>10/6/2020</a:t>
             </a:fld>
             <a:endParaRPr lang="en-US"/>
           </a:p>
@@ -2536,7 +2536,7 @@
     </p:spTree>
     <p:extLst>
       <p:ext uri="{BB962C8B-B14F-4D97-AF65-F5344CB8AC3E}">
-        <p14:creationId xmlns:p14="http://schemas.microsoft.com/office/powerpoint/2010/main" val="3734526729"/>
+        <p14:creationId xmlns:p14="http://schemas.microsoft.com/office/powerpoint/2010/main" val="2923981938"/>
       </p:ext>
     </p:extLst>
   </p:cSld>
@@ -2603,8 +2603,8 @@
         </p:nvSpPr>
         <p:spPr>
           <a:xfrm>
-            <a:off x="1097278" y="1845734"/>
-            <a:ext cx="4937760" cy="4023360"/>
+            <a:off x="1097280" y="1845734"/>
+            <a:ext cx="4937760" cy="4023359"/>
           </a:xfrm>
         </p:spPr>
         <p:txBody>
@@ -2614,7 +2614,7 @@
             <a:pPr lvl="0"/>
             <a:r>
               <a:rPr lang="en-US"/>
-              <a:t>Edit Master text styles</a:t>
+              <a:t>Click to edit Master text styles</a:t>
             </a:r>
           </a:p>
           <a:p>
@@ -2671,7 +2671,7 @@
             <a:pPr lvl="0"/>
             <a:r>
               <a:rPr lang="en-US"/>
-              <a:t>Edit Master text styles</a:t>
+              <a:t>Click to edit Master text styles</a:t>
             </a:r>
           </a:p>
           <a:p>
@@ -2722,7 +2722,7 @@
           <a:p>
             <a:fld id="{5EB2874E-DDE8-4CE4-9506-11F6EE6A859B}" type="datetime1">
               <a:rPr lang="en-US" smtClean="0"/>
-              <a:t>8/19/2019</a:t>
+              <a:t>10/6/2020</a:t>
             </a:fld>
             <a:endParaRPr lang="en-US"/>
           </a:p>
@@ -2776,7 +2776,7 @@
     </p:spTree>
     <p:extLst>
       <p:ext uri="{BB962C8B-B14F-4D97-AF65-F5344CB8AC3E}">
-        <p14:creationId xmlns:p14="http://schemas.microsoft.com/office/powerpoint/2010/main" val="2822336388"/>
+        <p14:creationId xmlns:p14="http://schemas.microsoft.com/office/powerpoint/2010/main" val="4141881213"/>
       </p:ext>
     </p:extLst>
   </p:cSld>
@@ -2897,7 +2897,7 @@
             <a:pPr lvl="0"/>
             <a:r>
               <a:rPr lang="en-US"/>
-              <a:t>Edit Master text styles</a:t>
+              <a:t>Click to edit Master text styles</a:t>
             </a:r>
           </a:p>
         </p:txBody>
@@ -2914,8 +2914,8 @@
         </p:nvSpPr>
         <p:spPr>
           <a:xfrm>
-            <a:off x="1097280" y="2582334"/>
-            <a:ext cx="4937760" cy="3378200"/>
+            <a:off x="1097280" y="2582335"/>
+            <a:ext cx="4937760" cy="3286760"/>
           </a:xfrm>
         </p:spPr>
         <p:txBody>
@@ -2925,7 +2925,7 @@
             <a:pPr lvl="0"/>
             <a:r>
               <a:rPr lang="en-US"/>
-              <a:t>Edit Master text styles</a:t>
+              <a:t>Click to edit Master text styles</a:t>
             </a:r>
           </a:p>
           <a:p>
@@ -3025,7 +3025,7 @@
             <a:pPr lvl="0"/>
             <a:r>
               <a:rPr lang="en-US"/>
-              <a:t>Edit Master text styles</a:t>
+              <a:t>Click to edit Master text styles</a:t>
             </a:r>
           </a:p>
         </p:txBody>
@@ -3043,7 +3043,7 @@
         <p:spPr>
           <a:xfrm>
             <a:off x="6217920" y="2582334"/>
-            <a:ext cx="4937760" cy="3378200"/>
+            <a:ext cx="4937760" cy="3286760"/>
           </a:xfrm>
         </p:spPr>
         <p:txBody>
@@ -3053,7 +3053,7 @@
             <a:pPr lvl="0"/>
             <a:r>
               <a:rPr lang="en-US"/>
-              <a:t>Edit Master text styles</a:t>
+              <a:t>Click to edit Master text styles</a:t>
             </a:r>
           </a:p>
           <a:p>
@@ -3104,7 +3104,7 @@
           <a:p>
             <a:fld id="{63D68EF0-BF8F-4E3C-9C05-745CC29F35F6}" type="datetime1">
               <a:rPr lang="en-US" smtClean="0"/>
-              <a:t>8/19/2019</a:t>
+              <a:t>10/6/2020</a:t>
             </a:fld>
             <a:endParaRPr lang="en-US"/>
           </a:p>
@@ -3158,7 +3158,7 @@
     </p:spTree>
     <p:extLst>
       <p:ext uri="{BB962C8B-B14F-4D97-AF65-F5344CB8AC3E}">
-        <p14:creationId xmlns:p14="http://schemas.microsoft.com/office/powerpoint/2010/main" val="3827130407"/>
+        <p14:creationId xmlns:p14="http://schemas.microsoft.com/office/powerpoint/2010/main" val="2704962446"/>
       </p:ext>
     </p:extLst>
   </p:cSld>
@@ -3225,7 +3225,7 @@
           <a:p>
             <a:fld id="{277C0380-A3C3-474B-ABAB-1F42FF55D86B}" type="datetime1">
               <a:rPr lang="en-US" smtClean="0"/>
-              <a:t>8/19/2019</a:t>
+              <a:t>10/6/2020</a:t>
             </a:fld>
             <a:endParaRPr lang="en-US"/>
           </a:p>
@@ -3279,7 +3279,7 @@
     </p:spTree>
     <p:extLst>
       <p:ext uri="{BB962C8B-B14F-4D97-AF65-F5344CB8AC3E}">
-        <p14:creationId xmlns:p14="http://schemas.microsoft.com/office/powerpoint/2010/main" val="410299835"/>
+        <p14:creationId xmlns:p14="http://schemas.microsoft.com/office/powerpoint/2010/main" val="833178563"/>
       </p:ext>
     </p:extLst>
   </p:cSld>
@@ -3399,7 +3399,7 @@
           <a:p>
             <a:fld id="{22885D81-B49B-4A1F-A46B-3FA8860DE8E3}" type="datetime1">
               <a:rPr lang="en-US" smtClean="0"/>
-              <a:t>8/19/2019</a:t>
+              <a:t>10/6/2020</a:t>
             </a:fld>
             <a:endParaRPr lang="en-US"/>
           </a:p>
@@ -3461,7 +3461,7 @@
     </p:spTree>
     <p:extLst>
       <p:ext uri="{BB962C8B-B14F-4D97-AF65-F5344CB8AC3E}">
-        <p14:creationId xmlns:p14="http://schemas.microsoft.com/office/powerpoint/2010/main" val="2514141424"/>
+        <p14:creationId xmlns:p14="http://schemas.microsoft.com/office/powerpoint/2010/main" val="613816952"/>
       </p:ext>
     </p:extLst>
   </p:cSld>
@@ -3625,7 +3625,7 @@
             <a:pPr lvl="0"/>
             <a:r>
               <a:rPr lang="en-US"/>
-              <a:t>Edit Master text styles</a:t>
+              <a:t>Click to edit Master text styles</a:t>
             </a:r>
           </a:p>
           <a:p>
@@ -3725,7 +3725,7 @@
             <a:pPr lvl="0"/>
             <a:r>
               <a:rPr lang="en-US"/>
-              <a:t>Edit Master text styles</a:t>
+              <a:t>Click to edit Master text styles</a:t>
             </a:r>
           </a:p>
         </p:txBody>
@@ -3756,7 +3756,7 @@
           <a:p>
             <a:fld id="{CE003DDC-C3D7-4B7E-9D6E-6FE1E60E6CD6}" type="datetime1">
               <a:rPr lang="en-US" smtClean="0"/>
-              <a:t>8/19/2019</a:t>
+              <a:t>10/6/2020</a:t>
             </a:fld>
             <a:endParaRPr lang="en-US"/>
           </a:p>
@@ -3774,8 +3774,8 @@
         </p:nvSpPr>
         <p:spPr>
           <a:xfrm>
-            <a:off x="4675517" y="6459785"/>
-            <a:ext cx="5753819" cy="365125"/>
+            <a:off x="4800600" y="6459785"/>
+            <a:ext cx="4648200" cy="365125"/>
           </a:xfrm>
         </p:spPr>
         <p:txBody>
@@ -3791,9 +3791,10 @@
           </a:lstStyle>
           <a:p>
             <a:r>
-              <a:rPr lang="en-US" dirty="0"/>
+              <a:rPr lang="en-US"/>
               <a:t>https://github.com/joegardnr/ResilientFaultTolerance</a:t>
             </a:r>
+            <a:endParaRPr lang="en-US" dirty="0"/>
           </a:p>
         </p:txBody>
       </p:sp>
@@ -3831,7 +3832,7 @@
     </p:spTree>
     <p:extLst>
       <p:ext uri="{BB962C8B-B14F-4D97-AF65-F5344CB8AC3E}">
-        <p14:creationId xmlns:p14="http://schemas.microsoft.com/office/powerpoint/2010/main" val="1598715605"/>
+        <p14:creationId xmlns:p14="http://schemas.microsoft.com/office/powerpoint/2010/main" val="2221870167"/>
       </p:ext>
     </p:extLst>
   </p:cSld>
@@ -3951,7 +3952,7 @@
           </a:xfrm>
         </p:spPr>
         <p:txBody>
-          <a:bodyPr lIns="91440" tIns="0" rIns="91440" bIns="0" anchor="b">
+          <a:bodyPr tIns="0" bIns="0" anchor="b">
             <a:noAutofit/>
           </a:bodyPr>
           <a:lstStyle>
@@ -4114,7 +4115,7 @@
             <a:pPr lvl="0"/>
             <a:r>
               <a:rPr lang="en-US"/>
-              <a:t>Edit Master text styles</a:t>
+              <a:t>Click to edit Master text styles</a:t>
             </a:r>
           </a:p>
         </p:txBody>
@@ -4136,7 +4137,7 @@
           <a:p>
             <a:fld id="{4C50796D-ED4F-411B-9976-A0E140ED846B}" type="datetime1">
               <a:rPr lang="en-US" smtClean="0"/>
-              <a:t>8/19/2019</a:t>
+              <a:t>10/6/2020</a:t>
             </a:fld>
             <a:endParaRPr lang="en-US"/>
           </a:p>
@@ -4190,7 +4191,7 @@
     </p:spTree>
     <p:extLst>
       <p:ext uri="{BB962C8B-B14F-4D97-AF65-F5344CB8AC3E}">
-        <p14:creationId xmlns:p14="http://schemas.microsoft.com/office/powerpoint/2010/main" val="4053509987"/>
+        <p14:creationId xmlns:p14="http://schemas.microsoft.com/office/powerpoint/2010/main" val="3160856354"/>
       </p:ext>
     </p:extLst>
   </p:cSld>
@@ -4230,8 +4231,8 @@
         </p:nvSpPr>
         <p:spPr>
           <a:xfrm>
-            <a:off x="0" y="6400800"/>
-            <a:ext cx="12192000" cy="457200"/>
+            <a:off x="3175" y="6400800"/>
+            <a:ext cx="12188825" cy="457200"/>
           </a:xfrm>
           <a:prstGeom prst="rect">
             <a:avLst/>
@@ -4269,7 +4270,7 @@
         <p:spPr>
           <a:xfrm>
             <a:off x="15" y="6334316"/>
-            <a:ext cx="12191985" cy="66484"/>
+            <a:ext cx="12188825" cy="64008"/>
           </a:xfrm>
           <a:prstGeom prst="rect">
             <a:avLst/>
@@ -4359,7 +4360,7 @@
             <a:pPr lvl="0"/>
             <a:r>
               <a:rPr lang="en-US" dirty="0"/>
-              <a:t>Edit Master text styles</a:t>
+              <a:t>Click to edit Master text styles</a:t>
             </a:r>
           </a:p>
           <a:p>
@@ -4405,7 +4406,7 @@
         <p:spPr>
           <a:xfrm>
             <a:off x="1097280" y="6459785"/>
-            <a:ext cx="1080507" cy="365125"/>
+            <a:ext cx="2472271" cy="365125"/>
           </a:xfrm>
           <a:prstGeom prst="rect">
             <a:avLst/>
@@ -4425,7 +4426,7 @@
           <a:p>
             <a:fld id="{256BFE09-05DC-4212-9A86-C209753491E3}" type="datetime1">
               <a:rPr lang="en-US" smtClean="0"/>
-              <a:t>8/19/2019</a:t>
+              <a:t>10/6/2020</a:t>
             </a:fld>
             <a:endParaRPr lang="en-US" dirty="0"/>
           </a:p>
@@ -4443,8 +4444,8 @@
         </p:nvSpPr>
         <p:spPr>
           <a:xfrm>
-            <a:off x="2152789" y="6459785"/>
-            <a:ext cx="8048445" cy="365125"/>
+            <a:off x="3686185" y="6459785"/>
+            <a:ext cx="4822804" cy="365125"/>
           </a:xfrm>
           <a:prstGeom prst="rect">
             <a:avLst/>
@@ -4454,7 +4455,7 @@
           <a:bodyPr vert="horz" lIns="91440" tIns="45720" rIns="91440" bIns="45720" rtlCol="0" anchor="ctr"/>
           <a:lstStyle>
             <a:lvl1pPr algn="ctr">
-              <a:defRPr sz="2000" cap="none" baseline="0">
+              <a:defRPr sz="1200" cap="all" baseline="0">
                 <a:solidFill>
                   <a:srgbClr val="FFFFFF"/>
                 </a:solidFill>
@@ -4463,10 +4464,10 @@
           </a:lstStyle>
           <a:p>
             <a:r>
-              <a:rPr lang="en-US"/>
+              <a:rPr lang="en-US" dirty="0"/>
               <a:t>https://github.com/joegardnr/ResilientFaultTolerance</a:t>
             </a:r>
-            <a:endParaRPr lang="en-US" dirty="0"/>
+            <a:endParaRPr lang="en-US" sz="1200" dirty="0"/>
           </a:p>
         </p:txBody>
       </p:sp>
@@ -4482,8 +4483,8 @@
         </p:nvSpPr>
         <p:spPr>
           <a:xfrm>
-            <a:off x="10429336" y="6459785"/>
-            <a:ext cx="783147" cy="365125"/>
+            <a:off x="9900458" y="6459785"/>
+            <a:ext cx="1312025" cy="365125"/>
           </a:xfrm>
           <a:prstGeom prst="rect">
             <a:avLst/>
@@ -4550,23 +4551,23 @@
     </p:spTree>
     <p:extLst>
       <p:ext uri="{BB962C8B-B14F-4D97-AF65-F5344CB8AC3E}">
-        <p14:creationId xmlns:p14="http://schemas.microsoft.com/office/powerpoint/2010/main" val="1141159696"/>
+        <p14:creationId xmlns:p14="http://schemas.microsoft.com/office/powerpoint/2010/main" val="3212836420"/>
       </p:ext>
     </p:extLst>
   </p:cSld>
   <p:clrMap bg1="lt1" tx1="dk1" bg2="lt2" tx2="dk2" accent1="accent1" accent2="accent2" accent3="accent3" accent4="accent4" accent5="accent5" accent6="accent6" hlink="hlink" folHlink="folHlink"/>
   <p:sldLayoutIdLst>
-    <p:sldLayoutId id="2147483702" r:id="rId1"/>
-    <p:sldLayoutId id="2147483703" r:id="rId2"/>
-    <p:sldLayoutId id="2147483704" r:id="rId3"/>
-    <p:sldLayoutId id="2147483705" r:id="rId4"/>
-    <p:sldLayoutId id="2147483706" r:id="rId5"/>
-    <p:sldLayoutId id="2147483707" r:id="rId6"/>
-    <p:sldLayoutId id="2147483708" r:id="rId7"/>
-    <p:sldLayoutId id="2147483709" r:id="rId8"/>
-    <p:sldLayoutId id="2147483710" r:id="rId9"/>
-    <p:sldLayoutId id="2147483711" r:id="rId10"/>
-    <p:sldLayoutId id="2147483712" r:id="rId11"/>
+    <p:sldLayoutId id="2147483786" r:id="rId1"/>
+    <p:sldLayoutId id="2147483787" r:id="rId2"/>
+    <p:sldLayoutId id="2147483788" r:id="rId3"/>
+    <p:sldLayoutId id="2147483789" r:id="rId4"/>
+    <p:sldLayoutId id="2147483790" r:id="rId5"/>
+    <p:sldLayoutId id="2147483791" r:id="rId6"/>
+    <p:sldLayoutId id="2147483792" r:id="rId7"/>
+    <p:sldLayoutId id="2147483793" r:id="rId8"/>
+    <p:sldLayoutId id="2147483794" r:id="rId9"/>
+    <p:sldLayoutId id="2147483795" r:id="rId10"/>
+    <p:sldLayoutId id="2147483796" r:id="rId11"/>
   </p:sldLayoutIdLst>
   <p:hf sldNum="0" hdr="0" dt="0"/>
   <p:txStyles>
@@ -5013,38 +5014,36 @@
         </p:spPr>
         <p:txBody>
           <a:bodyPr>
-            <a:normAutofit/>
+            <a:normAutofit lnSpcReduction="10000"/>
           </a:bodyPr>
           <a:lstStyle/>
           <a:p>
             <a:r>
               <a:rPr lang="en-US" dirty="0"/>
-              <a:t>Joe Gardner | Lead Developer | Clearent</a:t>
-            </a:r>
-          </a:p>
-          <a:p>
+              <a:t>Joe Gardner | Lead Developer </a:t>
+            </a:r>
+          </a:p>
+          <a:p>
+            <a:endParaRPr lang="en-US" dirty="0">
+              <a:hlinkClick r:id="rId2"/>
+            </a:endParaRPr>
+          </a:p>
+          <a:p>
+            <a:r>
+              <a:rPr lang="en-US" dirty="0">
+                <a:hlinkClick r:id="rId2"/>
+              </a:rPr>
+              <a:t>joegardner@gmail.com</a:t>
+            </a:r>
             <a:endParaRPr lang="en-US" dirty="0"/>
           </a:p>
           <a:p>
             <a:r>
               <a:rPr lang="en-US" dirty="0">
-                <a:hlinkClick r:id="rId2"/>
-              </a:rPr>
-              <a:t>jgardner@clearent.com</a:t>
-            </a:r>
-            <a:r>
-              <a:rPr lang="en-US" dirty="0"/>
-              <a:t> | </a:t>
-            </a:r>
-            <a:r>
-              <a:rPr lang="en-US" dirty="0">
                 <a:hlinkClick r:id="rId3"/>
               </a:rPr>
-              <a:t>https://developer.clearent.com</a:t>
-            </a:r>
-            <a:endParaRPr lang="en-US" dirty="0"/>
-          </a:p>
-          <a:p>
+              <a:t>https://www.linkedin.com/in/joegardner</a:t>
+            </a:r>
             <a:endParaRPr lang="en-US" dirty="0"/>
           </a:p>
           <a:p>
@@ -5081,42 +5080,6 @@
           </a:p>
         </p:txBody>
       </p:sp>
-      <p:pic>
-        <p:nvPicPr>
-          <p:cNvPr id="8" name="Picture 7">
-            <a:extLst>
-              <a:ext uri="{FF2B5EF4-FFF2-40B4-BE49-F238E27FC236}">
-                <a16:creationId xmlns:a16="http://schemas.microsoft.com/office/drawing/2014/main" id="{0E9CA455-2786-407D-B575-D18761EB0A25}"/>
-              </a:ext>
-            </a:extLst>
-          </p:cNvPr>
-          <p:cNvPicPr>
-            <a:picLocks noChangeAspect="1"/>
-          </p:cNvPicPr>
-          <p:nvPr/>
-        </p:nvPicPr>
-        <p:blipFill>
-          <a:blip r:embed="rId4">
-            <a:extLst>
-              <a:ext uri="{28A0092B-C50C-407E-A947-70E740481C1C}">
-                <a14:useLocalDpi xmlns:a14="http://schemas.microsoft.com/office/drawing/2010/main" val="0"/>
-              </a:ext>
-            </a:extLst>
-          </a:blip>
-          <a:stretch>
-            <a:fillRect/>
-          </a:stretch>
-        </p:blipFill>
-        <p:spPr>
-          <a:xfrm>
-            <a:off x="6986016" y="0"/>
-            <a:ext cx="5205984" cy="1395984"/>
-          </a:xfrm>
-          <a:prstGeom prst="rect">
-            <a:avLst/>
-          </a:prstGeom>
-        </p:spPr>
-      </p:pic>
     </p:spTree>
     <p:extLst>
       <p:ext uri="{BB962C8B-B14F-4D97-AF65-F5344CB8AC3E}">
@@ -5203,7 +5166,9 @@
           </a:xfrm>
         </p:spPr>
         <p:txBody>
-          <a:bodyPr/>
+          <a:bodyPr>
+            <a:normAutofit/>
+          </a:bodyPr>
           <a:lstStyle/>
           <a:p>
             <a:endParaRPr lang="en-US" dirty="0"/>
@@ -5246,6 +5211,34 @@
               <a:buNone/>
             </a:pPr>
             <a:endParaRPr lang="en-US" dirty="0"/>
+          </a:p>
+        </p:txBody>
+      </p:sp>
+      <p:sp>
+        <p:nvSpPr>
+          <p:cNvPr id="3" name="Footer Placeholder 2">
+            <a:extLst>
+              <a:ext uri="{FF2B5EF4-FFF2-40B4-BE49-F238E27FC236}">
+                <a16:creationId xmlns:a16="http://schemas.microsoft.com/office/drawing/2014/main" id="{F9DFB28C-E692-417A-9E20-01B70BD36F68}"/>
+              </a:ext>
+            </a:extLst>
+          </p:cNvPr>
+          <p:cNvSpPr>
+            <a:spLocks noGrp="1"/>
+          </p:cNvSpPr>
+          <p:nvPr>
+            <p:ph type="ftr" sz="quarter" idx="11"/>
+          </p:nvPr>
+        </p:nvSpPr>
+        <p:spPr/>
+        <p:txBody>
+          <a:bodyPr/>
+          <a:lstStyle/>
+          <a:p>
+            <a:r>
+              <a:rPr lang="en-US"/>
+              <a:t>https://github.com/joegardnr/ResilientFaultTolerance</a:t>
+            </a:r>
           </a:p>
         </p:txBody>
       </p:sp>
@@ -5802,34 +5795,6 @@
           </a:graphicData>
         </a:graphic>
       </p:graphicFrame>
-      <p:sp>
-        <p:nvSpPr>
-          <p:cNvPr id="3" name="Footer Placeholder 2">
-            <a:extLst>
-              <a:ext uri="{FF2B5EF4-FFF2-40B4-BE49-F238E27FC236}">
-                <a16:creationId xmlns:a16="http://schemas.microsoft.com/office/drawing/2014/main" id="{F9DFB28C-E692-417A-9E20-01B70BD36F68}"/>
-              </a:ext>
-            </a:extLst>
-          </p:cNvPr>
-          <p:cNvSpPr>
-            <a:spLocks noGrp="1"/>
-          </p:cNvSpPr>
-          <p:nvPr>
-            <p:ph type="ftr" sz="quarter" idx="11"/>
-          </p:nvPr>
-        </p:nvSpPr>
-        <p:spPr/>
-        <p:txBody>
-          <a:bodyPr/>
-          <a:lstStyle/>
-          <a:p>
-            <a:r>
-              <a:rPr lang="en-US"/>
-              <a:t>https://github.com/joegardnr/ResilientFaultTolerance</a:t>
-            </a:r>
-          </a:p>
-        </p:txBody>
-      </p:sp>
     </p:spTree>
     <p:extLst>
       <p:ext uri="{BB962C8B-B14F-4D97-AF65-F5344CB8AC3E}">
@@ -5912,9 +5877,14 @@
           </a:xfrm>
         </p:spPr>
         <p:txBody>
-          <a:bodyPr/>
+          <a:bodyPr>
+            <a:normAutofit fontScale="92500" lnSpcReduction="10000"/>
+          </a:bodyPr>
           <a:lstStyle/>
           <a:p>
+            <a:pPr marL="0" indent="0">
+              <a:buNone/>
+            </a:pPr>
             <a:r>
               <a:rPr lang="en-US" dirty="0">
                 <a:solidFill>
@@ -5968,6 +5938,9 @@
             </a:endParaRPr>
           </a:p>
           <a:p>
+            <a:pPr marL="0" indent="0">
+              <a:buNone/>
+            </a:pPr>
             <a:r>
               <a:rPr lang="en-US" dirty="0">
                 <a:solidFill>
@@ -6015,16 +5988,120 @@
             </a:r>
           </a:p>
           <a:p>
-            <a:r>
-              <a:rPr lang="en-US" dirty="0">
-                <a:solidFill>
-                  <a:srgbClr val="000000"/>
-                </a:solidFill>
+            <a:pPr marL="0" indent="0">
+              <a:buNone/>
+            </a:pPr>
+            <a:r>
+              <a:rPr lang="en-US" b="0" dirty="0">
+                <a:solidFill>
+                  <a:srgbClr val="000000"/>
+                </a:solidFill>
+                <a:effectLst/>
                 <a:latin typeface="Consolas" panose="020B0609020204030204" pitchFamily="49" charset="0"/>
               </a:rPr>
               <a:t>             .</a:t>
             </a:r>
             <a:r>
+              <a:rPr lang="en-US" b="0" dirty="0" err="1">
+                <a:solidFill>
+                  <a:srgbClr val="795E26"/>
+                </a:solidFill>
+                <a:effectLst/>
+                <a:latin typeface="Consolas" panose="020B0609020204030204" pitchFamily="49" charset="0"/>
+              </a:rPr>
+              <a:t>OrResult</a:t>
+            </a:r>
+            <a:r>
+              <a:rPr lang="en-US" b="0" dirty="0">
+                <a:solidFill>
+                  <a:srgbClr val="000000"/>
+                </a:solidFill>
+                <a:effectLst/>
+                <a:latin typeface="Consolas" panose="020B0609020204030204" pitchFamily="49" charset="0"/>
+              </a:rPr>
+              <a:t>((</a:t>
+            </a:r>
+            <a:r>
+              <a:rPr lang="en-US" b="0" dirty="0">
+                <a:solidFill>
+                  <a:srgbClr val="001080"/>
+                </a:solidFill>
+                <a:effectLst/>
+                <a:latin typeface="Consolas" panose="020B0609020204030204" pitchFamily="49" charset="0"/>
+              </a:rPr>
+              <a:t>result</a:t>
+            </a:r>
+            <a:r>
+              <a:rPr lang="en-US" b="0" dirty="0">
+                <a:solidFill>
+                  <a:srgbClr val="000000"/>
+                </a:solidFill>
+                <a:effectLst/>
+                <a:latin typeface="Consolas" panose="020B0609020204030204" pitchFamily="49" charset="0"/>
+              </a:rPr>
+              <a:t>) =&gt; (</a:t>
+            </a:r>
+            <a:r>
+              <a:rPr lang="en-US" b="0" dirty="0">
+                <a:solidFill>
+                  <a:srgbClr val="001080"/>
+                </a:solidFill>
+                <a:effectLst/>
+                <a:latin typeface="Consolas" panose="020B0609020204030204" pitchFamily="49" charset="0"/>
+              </a:rPr>
+              <a:t>result</a:t>
+            </a:r>
+            <a:r>
+              <a:rPr lang="en-US" b="0" dirty="0">
+                <a:solidFill>
+                  <a:srgbClr val="000000"/>
+                </a:solidFill>
+                <a:effectLst/>
+                <a:latin typeface="Consolas" panose="020B0609020204030204" pitchFamily="49" charset="0"/>
+              </a:rPr>
+              <a:t> &lt; </a:t>
+            </a:r>
+            <a:r>
+              <a:rPr lang="en-US" b="0" dirty="0">
+                <a:solidFill>
+                  <a:srgbClr val="098658"/>
+                </a:solidFill>
+                <a:effectLst/>
+                <a:latin typeface="Consolas" panose="020B0609020204030204" pitchFamily="49" charset="0"/>
+              </a:rPr>
+              <a:t>0</a:t>
+            </a:r>
+            <a:r>
+              <a:rPr lang="en-US" b="0" dirty="0">
+                <a:solidFill>
+                  <a:srgbClr val="000000"/>
+                </a:solidFill>
+                <a:effectLst/>
+                <a:latin typeface="Consolas" panose="020B0609020204030204" pitchFamily="49" charset="0"/>
+              </a:rPr>
+              <a:t>))</a:t>
+            </a:r>
+            <a:endParaRPr lang="en-US" dirty="0">
+              <a:solidFill>
+                <a:srgbClr val="000000"/>
+              </a:solidFill>
+              <a:latin typeface="Consolas" panose="020B0609020204030204" pitchFamily="49" charset="0"/>
+            </a:endParaRPr>
+          </a:p>
+          <a:p>
+            <a:pPr marL="0" indent="0">
+              <a:buNone/>
+            </a:pPr>
+            <a:r>
+              <a:rPr lang="en-US" dirty="0">
+                <a:solidFill>
+                  <a:srgbClr val="000000"/>
+                </a:solidFill>
+                <a:latin typeface="Consolas" panose="020B0609020204030204" pitchFamily="49" charset="0"/>
+              </a:rPr>
+              <a:t>             .</a:t>
+            </a:r>
+            <a:r>
               <a:rPr lang="en-US" dirty="0" err="1">
                 <a:solidFill>
                   <a:srgbClr val="795E26"/>
@@ -6089,6 +6166,9 @@
             </a:r>
           </a:p>
           <a:p>
+            <a:pPr marL="0" indent="0">
+              <a:buNone/>
+            </a:pPr>
             <a:endParaRPr lang="en-US" dirty="0">
               <a:solidFill>
                 <a:srgbClr val="0000FF"/>
@@ -6097,6 +6177,9 @@
             </a:endParaRPr>
           </a:p>
           <a:p>
+            <a:pPr marL="0" indent="0">
+              <a:buNone/>
+            </a:pPr>
             <a:r>
               <a:rPr lang="en-US" dirty="0">
                 <a:solidFill>
@@ -6150,6 +6233,9 @@
             </a:endParaRPr>
           </a:p>
           <a:p>
+            <a:pPr marL="0" indent="0">
+              <a:buNone/>
+            </a:pPr>
             <a:r>
               <a:rPr lang="en-US" dirty="0">
                 <a:solidFill>
@@ -6197,20 +6283,124 @@
             </a:r>
           </a:p>
           <a:p>
-            <a:r>
-              <a:rPr lang="en-US" dirty="0">
-                <a:solidFill>
-                  <a:srgbClr val="000000"/>
-                </a:solidFill>
+            <a:pPr marL="0" indent="0">
+              <a:buNone/>
+            </a:pPr>
+            <a:r>
+              <a:rPr lang="en-US" b="0" dirty="0">
+                <a:solidFill>
+                  <a:srgbClr val="000000"/>
+                </a:solidFill>
+                <a:effectLst/>
                 <a:latin typeface="Consolas" panose="020B0609020204030204" pitchFamily="49" charset="0"/>
               </a:rPr>
               <a:t>               .</a:t>
             </a:r>
             <a:r>
-              <a:rPr lang="en-US" dirty="0">
+              <a:rPr lang="en-US" b="0" dirty="0" err="1">
                 <a:solidFill>
                   <a:srgbClr val="795E26"/>
                 </a:solidFill>
+                <a:effectLst/>
+                <a:latin typeface="Consolas" panose="020B0609020204030204" pitchFamily="49" charset="0"/>
+              </a:rPr>
+              <a:t>OrResult</a:t>
+            </a:r>
+            <a:r>
+              <a:rPr lang="en-US" b="0" dirty="0">
+                <a:solidFill>
+                  <a:srgbClr val="000000"/>
+                </a:solidFill>
+                <a:effectLst/>
+                <a:latin typeface="Consolas" panose="020B0609020204030204" pitchFamily="49" charset="0"/>
+              </a:rPr>
+              <a:t>((</a:t>
+            </a:r>
+            <a:r>
+              <a:rPr lang="en-US" b="0" dirty="0">
+                <a:solidFill>
+                  <a:srgbClr val="001080"/>
+                </a:solidFill>
+                <a:effectLst/>
+                <a:latin typeface="Consolas" panose="020B0609020204030204" pitchFamily="49" charset="0"/>
+              </a:rPr>
+              <a:t>result</a:t>
+            </a:r>
+            <a:r>
+              <a:rPr lang="en-US" b="0" dirty="0">
+                <a:solidFill>
+                  <a:srgbClr val="000000"/>
+                </a:solidFill>
+                <a:effectLst/>
+                <a:latin typeface="Consolas" panose="020B0609020204030204" pitchFamily="49" charset="0"/>
+              </a:rPr>
+              <a:t>) =&gt; (</a:t>
+            </a:r>
+            <a:r>
+              <a:rPr lang="en-US" b="0" dirty="0">
+                <a:solidFill>
+                  <a:srgbClr val="001080"/>
+                </a:solidFill>
+                <a:effectLst/>
+                <a:latin typeface="Consolas" panose="020B0609020204030204" pitchFamily="49" charset="0"/>
+              </a:rPr>
+              <a:t>result</a:t>
+            </a:r>
+            <a:r>
+              <a:rPr lang="en-US" b="0" dirty="0">
+                <a:solidFill>
+                  <a:srgbClr val="000000"/>
+                </a:solidFill>
+                <a:effectLst/>
+                <a:latin typeface="Consolas" panose="020B0609020204030204" pitchFamily="49" charset="0"/>
+              </a:rPr>
+              <a:t> &lt; </a:t>
+            </a:r>
+            <a:r>
+              <a:rPr lang="en-US" b="0" dirty="0">
+                <a:solidFill>
+                  <a:srgbClr val="098658"/>
+                </a:solidFill>
+                <a:effectLst/>
+                <a:latin typeface="Consolas" panose="020B0609020204030204" pitchFamily="49" charset="0"/>
+              </a:rPr>
+              <a:t>0</a:t>
+            </a:r>
+            <a:r>
+              <a:rPr lang="en-US" b="0" dirty="0">
+                <a:solidFill>
+                  <a:srgbClr val="000000"/>
+                </a:solidFill>
+                <a:effectLst/>
+                <a:latin typeface="Consolas" panose="020B0609020204030204" pitchFamily="49" charset="0"/>
+              </a:rPr>
+              <a:t>))</a:t>
+            </a:r>
+            <a:endParaRPr lang="en-US" dirty="0">
+              <a:solidFill>
+                <a:srgbClr val="000000"/>
+              </a:solidFill>
+              <a:latin typeface="Consolas" panose="020B0609020204030204" pitchFamily="49" charset="0"/>
+            </a:endParaRPr>
+          </a:p>
+          <a:p>
+            <a:pPr marL="0" indent="0">
+              <a:buNone/>
+            </a:pPr>
+            <a:r>
+              <a:rPr lang="en-US" dirty="0">
+                <a:solidFill>
+                  <a:srgbClr val="000000"/>
+                </a:solidFill>
+                <a:latin typeface="Consolas" panose="020B0609020204030204" pitchFamily="49" charset="0"/>
+              </a:rPr>
+              <a:t>               .</a:t>
+            </a:r>
+            <a:r>
+              <a:rPr lang="en-US" dirty="0">
+                <a:solidFill>
+                  <a:srgbClr val="795E26"/>
+                </a:solidFill>
                 <a:latin typeface="Consolas" panose="020B0609020204030204" pitchFamily="49" charset="0"/>
               </a:rPr>
               <a:t>Fallback</a:t>
@@ -6244,6 +6434,9 @@
             </a:r>
           </a:p>
           <a:p>
+            <a:pPr marL="0" indent="0">
+              <a:buNone/>
+            </a:pPr>
             <a:endParaRPr lang="en-US" dirty="0">
               <a:solidFill>
                 <a:srgbClr val="0000FF"/>
@@ -6252,6 +6445,9 @@
             </a:endParaRPr>
           </a:p>
           <a:p>
+            <a:pPr marL="0" indent="0">
+              <a:buNone/>
+            </a:pPr>
             <a:r>
               <a:rPr lang="en-US" dirty="0">
                 <a:solidFill>
@@ -6373,6 +6569,9 @@
             </a:endParaRPr>
           </a:p>
           <a:p>
+            <a:pPr marL="0" indent="0">
+              <a:buNone/>
+            </a:pPr>
             <a:r>
               <a:rPr lang="en-US" dirty="0">
                 <a:solidFill>
@@ -8107,7 +8306,9 @@
         </p:nvSpPr>
         <p:spPr/>
         <p:txBody>
-          <a:bodyPr/>
+          <a:bodyPr>
+            <a:normAutofit/>
+          </a:bodyPr>
           <a:lstStyle/>
           <a:p>
             <a:r>
@@ -8176,7 +8377,9 @@
           </a:xfrm>
         </p:spPr>
         <p:txBody>
-          <a:bodyPr/>
+          <a:bodyPr>
+            <a:normAutofit/>
+          </a:bodyPr>
           <a:lstStyle/>
           <a:p>
             <a:pPr marL="0" indent="0">
@@ -8656,7 +8859,9 @@
         </p:nvSpPr>
         <p:spPr/>
         <p:txBody>
-          <a:bodyPr/>
+          <a:bodyPr>
+            <a:normAutofit/>
+          </a:bodyPr>
           <a:lstStyle/>
           <a:p>
             <a:r>
@@ -8669,7 +8874,7 @@
             </a:r>
             <a:r>
               <a:rPr lang="en-US" dirty="0"/>
-              <a:t> Core 2.1</a:t>
+              <a:t> Core as of 2.1</a:t>
             </a:r>
           </a:p>
           <a:p>
@@ -8722,7 +8927,9 @@
         </p:nvSpPr>
         <p:spPr/>
         <p:txBody>
-          <a:bodyPr/>
+          <a:bodyPr>
+            <a:normAutofit/>
+          </a:bodyPr>
           <a:lstStyle/>
           <a:p>
             <a:pPr marL="0" indent="0">
@@ -9176,6 +9383,34 @@
             <a:r>
               <a:rPr lang="en-US" i="1" dirty="0"/>
               <a:t>Noun: an ability to recover from or adjust easily to misfortune or change</a:t>
+            </a:r>
+          </a:p>
+        </p:txBody>
+      </p:sp>
+      <p:sp>
+        <p:nvSpPr>
+          <p:cNvPr id="4" name="Footer Placeholder 3">
+            <a:extLst>
+              <a:ext uri="{FF2B5EF4-FFF2-40B4-BE49-F238E27FC236}">
+                <a16:creationId xmlns:a16="http://schemas.microsoft.com/office/drawing/2014/main" id="{D45D3342-8300-4DCB-AB94-0E5ACA46458D}"/>
+              </a:ext>
+            </a:extLst>
+          </p:cNvPr>
+          <p:cNvSpPr>
+            <a:spLocks noGrp="1"/>
+          </p:cNvSpPr>
+          <p:nvPr>
+            <p:ph type="ftr" sz="quarter" idx="11"/>
+          </p:nvPr>
+        </p:nvSpPr>
+        <p:spPr/>
+        <p:txBody>
+          <a:bodyPr/>
+          <a:lstStyle/>
+          <a:p>
+            <a:r>
+              <a:rPr lang="en-US"/>
+              <a:t>https://github.com/joegardnr/ResilientFaultTolerance</a:t>
             </a:r>
           </a:p>
         </p:txBody>
@@ -9227,34 +9462,6 @@
           </a:extLst>
         </p:spPr>
       </p:pic>
-      <p:sp>
-        <p:nvSpPr>
-          <p:cNvPr id="4" name="Footer Placeholder 3">
-            <a:extLst>
-              <a:ext uri="{FF2B5EF4-FFF2-40B4-BE49-F238E27FC236}">
-                <a16:creationId xmlns:a16="http://schemas.microsoft.com/office/drawing/2014/main" id="{D45D3342-8300-4DCB-AB94-0E5ACA46458D}"/>
-              </a:ext>
-            </a:extLst>
-          </p:cNvPr>
-          <p:cNvSpPr>
-            <a:spLocks noGrp="1"/>
-          </p:cNvSpPr>
-          <p:nvPr>
-            <p:ph type="ftr" sz="quarter" idx="11"/>
-          </p:nvPr>
-        </p:nvSpPr>
-        <p:spPr/>
-        <p:txBody>
-          <a:bodyPr/>
-          <a:lstStyle/>
-          <a:p>
-            <a:r>
-              <a:rPr lang="en-US"/>
-              <a:t>https://github.com/joegardnr/ResilientFaultTolerance</a:t>
-            </a:r>
-          </a:p>
-        </p:txBody>
-      </p:sp>
     </p:spTree>
     <p:extLst>
       <p:ext uri="{BB962C8B-B14F-4D97-AF65-F5344CB8AC3E}">
@@ -9331,7 +9538,9 @@
         </p:nvSpPr>
         <p:spPr/>
         <p:txBody>
-          <a:bodyPr/>
+          <a:bodyPr>
+            <a:normAutofit/>
+          </a:bodyPr>
           <a:lstStyle/>
           <a:p>
             <a:r>
@@ -9404,7 +9613,7 @@
               <a:rPr lang="en-US" dirty="0">
                 <a:hlinkClick r:id="rId5"/>
               </a:rPr>
-              <a:t>jgardner@clearent.com</a:t>
+              <a:t>joegardner@gmail.com</a:t>
             </a:r>
             <a:r>
               <a:rPr lang="en-US" dirty="0"/>
@@ -9414,17 +9623,8 @@
               <a:rPr lang="en-US" dirty="0">
                 <a:hlinkClick r:id="rId6"/>
               </a:rPr>
-              <a:t>https://developer.clearent.com</a:t>
-            </a:r>
-            <a:endParaRPr lang="en-US" dirty="0"/>
-          </a:p>
-          <a:p>
-            <a:endParaRPr lang="en-US" dirty="0"/>
-          </a:p>
-          <a:p>
-            <a:endParaRPr lang="en-US" dirty="0"/>
-          </a:p>
-          <a:p>
+              <a:t>https://www.linkedin.com/in/joegardner</a:t>
+            </a:r>
             <a:endParaRPr lang="en-US" dirty="0"/>
           </a:p>
         </p:txBody>
@@ -9457,42 +9657,6 @@
           </a:p>
         </p:txBody>
       </p:sp>
-      <p:pic>
-        <p:nvPicPr>
-          <p:cNvPr id="6" name="Picture 5">
-            <a:extLst>
-              <a:ext uri="{FF2B5EF4-FFF2-40B4-BE49-F238E27FC236}">
-                <a16:creationId xmlns:a16="http://schemas.microsoft.com/office/drawing/2014/main" id="{92C450C8-13BB-43C9-8437-40DE92458DEC}"/>
-              </a:ext>
-            </a:extLst>
-          </p:cNvPr>
-          <p:cNvPicPr>
-            <a:picLocks noChangeAspect="1"/>
-          </p:cNvPicPr>
-          <p:nvPr/>
-        </p:nvPicPr>
-        <p:blipFill>
-          <a:blip r:embed="rId7">
-            <a:extLst>
-              <a:ext uri="{28A0092B-C50C-407E-A947-70E740481C1C}">
-                <a14:useLocalDpi xmlns:a14="http://schemas.microsoft.com/office/drawing/2010/main" val="0"/>
-              </a:ext>
-            </a:extLst>
-          </a:blip>
-          <a:stretch>
-            <a:fillRect/>
-          </a:stretch>
-        </p:blipFill>
-        <p:spPr>
-          <a:xfrm>
-            <a:off x="6986016" y="0"/>
-            <a:ext cx="5205984" cy="1395984"/>
-          </a:xfrm>
-          <a:prstGeom prst="rect">
-            <a:avLst/>
-          </a:prstGeom>
-        </p:spPr>
-      </p:pic>
     </p:spTree>
     <p:extLst>
       <p:ext uri="{BB962C8B-B14F-4D97-AF65-F5344CB8AC3E}">
@@ -12054,6 +12218,34 @@
               <a:t>http://www.thepollyproject.org/</a:t>
             </a:r>
             <a:endParaRPr lang="en-US" dirty="0"/>
+          </a:p>
+        </p:txBody>
+      </p:sp>
+      <p:sp>
+        <p:nvSpPr>
+          <p:cNvPr id="4" name="Footer Placeholder 3">
+            <a:extLst>
+              <a:ext uri="{FF2B5EF4-FFF2-40B4-BE49-F238E27FC236}">
+                <a16:creationId xmlns:a16="http://schemas.microsoft.com/office/drawing/2014/main" id="{D2BA124D-17FB-4644-B566-3781B0F6B33C}"/>
+              </a:ext>
+            </a:extLst>
+          </p:cNvPr>
+          <p:cNvSpPr>
+            <a:spLocks noGrp="1"/>
+          </p:cNvSpPr>
+          <p:nvPr>
+            <p:ph type="ftr" sz="quarter" idx="11"/>
+          </p:nvPr>
+        </p:nvSpPr>
+        <p:spPr/>
+        <p:txBody>
+          <a:bodyPr/>
+          <a:lstStyle/>
+          <a:p>
+            <a:r>
+              <a:rPr lang="en-US"/>
+              <a:t>https://github.com/joegardnr/ResilientFaultTolerance</a:t>
+            </a:r>
           </a:p>
         </p:txBody>
       </p:sp>
@@ -12104,34 +12296,6 @@
           </a:extLst>
         </p:spPr>
       </p:pic>
-      <p:sp>
-        <p:nvSpPr>
-          <p:cNvPr id="4" name="Footer Placeholder 3">
-            <a:extLst>
-              <a:ext uri="{FF2B5EF4-FFF2-40B4-BE49-F238E27FC236}">
-                <a16:creationId xmlns:a16="http://schemas.microsoft.com/office/drawing/2014/main" id="{D2BA124D-17FB-4644-B566-3781B0F6B33C}"/>
-              </a:ext>
-            </a:extLst>
-          </p:cNvPr>
-          <p:cNvSpPr>
-            <a:spLocks noGrp="1"/>
-          </p:cNvSpPr>
-          <p:nvPr>
-            <p:ph type="ftr" sz="quarter" idx="11"/>
-          </p:nvPr>
-        </p:nvSpPr>
-        <p:spPr/>
-        <p:txBody>
-          <a:bodyPr/>
-          <a:lstStyle/>
-          <a:p>
-            <a:r>
-              <a:rPr lang="en-US"/>
-              <a:t>https://github.com/joegardnr/ResilientFaultTolerance</a:t>
-            </a:r>
-          </a:p>
-        </p:txBody>
-      </p:sp>
     </p:spTree>
     <p:extLst>
       <p:ext uri="{BB962C8B-B14F-4D97-AF65-F5344CB8AC3E}">
@@ -12413,31 +12577,31 @@
         <a:sysClr val="window" lastClr="FFFFFF"/>
       </a:lt1>
       <a:dk2>
-        <a:srgbClr val="455F51"/>
+        <a:srgbClr val="344068"/>
       </a:dk2>
       <a:lt2>
-        <a:srgbClr val="E2DFCC"/>
+        <a:srgbClr val="D9E0E6"/>
       </a:lt2>
       <a:accent1>
-        <a:srgbClr val="99CB38"/>
+        <a:srgbClr val="1CADE4"/>
       </a:accent1>
       <a:accent2>
-        <a:srgbClr val="63A537"/>
+        <a:srgbClr val="2683C6"/>
       </a:accent2>
       <a:accent3>
-        <a:srgbClr val="37A76F"/>
+        <a:srgbClr val="28C4CC"/>
       </a:accent3>
       <a:accent4>
-        <a:srgbClr val="44C1A3"/>
+        <a:srgbClr val="42BA97"/>
       </a:accent4>
       <a:accent5>
-        <a:srgbClr val="4EB3CF"/>
+        <a:srgbClr val="3E8853"/>
       </a:accent5>
       <a:accent6>
-        <a:srgbClr val="51C3F9"/>
+        <a:srgbClr val="62A39F"/>
       </a:accent6>
       <a:hlink>
-        <a:srgbClr val="6B9F25"/>
+        <a:srgbClr val="6EAC1C"/>
       </a:hlink>
       <a:folHlink>
         <a:srgbClr val="B26B02"/>
@@ -12679,7 +12843,7 @@
   <a:extraClrSchemeLst/>
   <a:extLst>
     <a:ext uri="{05A4C25C-085E-4340-85A3-A5531E510DB2}">
-      <thm15:themeFamily xmlns:thm15="http://schemas.microsoft.com/office/thememl/2012/main" name="Retrospect" id="{5F128B03-DCCA-4EEB-AB3B-CF2899314A46}" vid="{D26EA377-59BD-4C9C-9D94-EE8416EE4C79}"/>
+      <thm15:themeFamily xmlns:thm15="http://schemas.microsoft.com/office/thememl/2012/main" name="Retrospect" id="{5F128B03-DCCA-4EEB-AB3B-CF2899314A46}" vid="{9CC26709-368C-4D72-9060-94E5B3FF3CD6}"/>
     </a:ext>
   </a:extLst>
 </a:theme>

</xml_diff>